<commit_message>
Update Meeting 1 Slide Deck (all freely available)
</commit_message>
<xml_diff>
--- a/Meeting-1-Slide-Deck.pptx
+++ b/Meeting-1-Slide-Deck.pptx
@@ -211,7 +211,7 @@
           <a:p>
             <a:fld id="{F343E9B7-B943-DB46-9965-00590DE97EAB}" type="datetimeFigureOut">
               <a:rPr lang="en-US" smtClean="0"/>
-              <a:t>8/25/20</a:t>
+              <a:t>9/1/20</a:t>
             </a:fld>
             <a:endParaRPr lang="en-US"/>
           </a:p>
@@ -861,7 +861,7 @@
           <a:p>
             <a:fld id="{C75DB29D-57C8-104E-820C-5FC7CEF87FF2}" type="datetimeFigureOut">
               <a:rPr lang="en-US" smtClean="0"/>
-              <a:t>8/25/20</a:t>
+              <a:t>9/1/20</a:t>
             </a:fld>
             <a:endParaRPr lang="en-US"/>
           </a:p>
@@ -1031,7 +1031,7 @@
           <a:p>
             <a:fld id="{C75DB29D-57C8-104E-820C-5FC7CEF87FF2}" type="datetimeFigureOut">
               <a:rPr lang="en-US" smtClean="0"/>
-              <a:t>8/25/20</a:t>
+              <a:t>9/1/20</a:t>
             </a:fld>
             <a:endParaRPr lang="en-US"/>
           </a:p>
@@ -1211,7 +1211,7 @@
           <a:p>
             <a:fld id="{C75DB29D-57C8-104E-820C-5FC7CEF87FF2}" type="datetimeFigureOut">
               <a:rPr lang="en-US" smtClean="0"/>
-              <a:t>8/25/20</a:t>
+              <a:t>9/1/20</a:t>
             </a:fld>
             <a:endParaRPr lang="en-US"/>
           </a:p>
@@ -1381,7 +1381,7 @@
           <a:p>
             <a:fld id="{C75DB29D-57C8-104E-820C-5FC7CEF87FF2}" type="datetimeFigureOut">
               <a:rPr lang="en-US" smtClean="0"/>
-              <a:t>8/25/20</a:t>
+              <a:t>9/1/20</a:t>
             </a:fld>
             <a:endParaRPr lang="en-US"/>
           </a:p>
@@ -1625,7 +1625,7 @@
           <a:p>
             <a:fld id="{C75DB29D-57C8-104E-820C-5FC7CEF87FF2}" type="datetimeFigureOut">
               <a:rPr lang="en-US" smtClean="0"/>
-              <a:t>8/25/20</a:t>
+              <a:t>9/1/20</a:t>
             </a:fld>
             <a:endParaRPr lang="en-US"/>
           </a:p>
@@ -1857,7 +1857,7 @@
           <a:p>
             <a:fld id="{C75DB29D-57C8-104E-820C-5FC7CEF87FF2}" type="datetimeFigureOut">
               <a:rPr lang="en-US" smtClean="0"/>
-              <a:t>8/25/20</a:t>
+              <a:t>9/1/20</a:t>
             </a:fld>
             <a:endParaRPr lang="en-US"/>
           </a:p>
@@ -2224,7 +2224,7 @@
           <a:p>
             <a:fld id="{C75DB29D-57C8-104E-820C-5FC7CEF87FF2}" type="datetimeFigureOut">
               <a:rPr lang="en-US" smtClean="0"/>
-              <a:t>8/25/20</a:t>
+              <a:t>9/1/20</a:t>
             </a:fld>
             <a:endParaRPr lang="en-US"/>
           </a:p>
@@ -2342,7 +2342,7 @@
           <a:p>
             <a:fld id="{C75DB29D-57C8-104E-820C-5FC7CEF87FF2}" type="datetimeFigureOut">
               <a:rPr lang="en-US" smtClean="0"/>
-              <a:t>8/25/20</a:t>
+              <a:t>9/1/20</a:t>
             </a:fld>
             <a:endParaRPr lang="en-US"/>
           </a:p>
@@ -2437,7 +2437,7 @@
           <a:p>
             <a:fld id="{C75DB29D-57C8-104E-820C-5FC7CEF87FF2}" type="datetimeFigureOut">
               <a:rPr lang="en-US" smtClean="0"/>
-              <a:t>8/25/20</a:t>
+              <a:t>9/1/20</a:t>
             </a:fld>
             <a:endParaRPr lang="en-US"/>
           </a:p>
@@ -2714,7 +2714,7 @@
           <a:p>
             <a:fld id="{C75DB29D-57C8-104E-820C-5FC7CEF87FF2}" type="datetimeFigureOut">
               <a:rPr lang="en-US" smtClean="0"/>
-              <a:t>8/25/20</a:t>
+              <a:t>9/1/20</a:t>
             </a:fld>
             <a:endParaRPr lang="en-US"/>
           </a:p>
@@ -2971,7 +2971,7 @@
           <a:p>
             <a:fld id="{C75DB29D-57C8-104E-820C-5FC7CEF87FF2}" type="datetimeFigureOut">
               <a:rPr lang="en-US" smtClean="0"/>
-              <a:t>8/25/20</a:t>
+              <a:t>9/1/20</a:t>
             </a:fld>
             <a:endParaRPr lang="en-US"/>
           </a:p>
@@ -3184,7 +3184,7 @@
           <a:p>
             <a:fld id="{C75DB29D-57C8-104E-820C-5FC7CEF87FF2}" type="datetimeFigureOut">
               <a:rPr lang="en-US" smtClean="0"/>
-              <a:t>8/25/20</a:t>
+              <a:t>9/1/20</a:t>
             </a:fld>
             <a:endParaRPr lang="en-US"/>
           </a:p>
@@ -3929,15 +3929,7 @@
             </a:pPr>
             <a:r>
               <a:rPr lang="en-US" sz="2000" dirty="0"/>
-              <a:t>Logical </a:t>
-            </a:r>
-            <a:r>
-              <a:rPr lang="en-US" sz="2000" dirty="0" err="1"/>
-              <a:t>fallicy</a:t>
-            </a:r>
-            <a:r>
-              <a:rPr lang="en-US" sz="2000" dirty="0"/>
-              <a:t> slides adapted from: Bentley et al. (2016). Carbon, Climate, and Energy Resources, </a:t>
+              <a:t>Logical fallacy slides adapted from: Bentley et al. (2016). Carbon, Climate, and Energy Resources, </a:t>
             </a:r>
             <a:r>
               <a:rPr lang="en-US" sz="2000" i="1" dirty="0" err="1"/>

</xml_diff>

<commit_message>
Minor updates to Meeting 1 Slide Deck
</commit_message>
<xml_diff>
--- a/Meeting-1-Slide-Deck.pptx
+++ b/Meeting-1-Slide-Deck.pptx
@@ -211,7 +211,7 @@
           <a:p>
             <a:fld id="{F343E9B7-B943-DB46-9965-00590DE97EAB}" type="datetimeFigureOut">
               <a:rPr lang="en-US" smtClean="0"/>
-              <a:t>9/1/20</a:t>
+              <a:t>9/13/21</a:t>
             </a:fld>
             <a:endParaRPr lang="en-US"/>
           </a:p>
@@ -861,7 +861,7 @@
           <a:p>
             <a:fld id="{C75DB29D-57C8-104E-820C-5FC7CEF87FF2}" type="datetimeFigureOut">
               <a:rPr lang="en-US" smtClean="0"/>
-              <a:t>9/1/20</a:t>
+              <a:t>9/13/21</a:t>
             </a:fld>
             <a:endParaRPr lang="en-US"/>
           </a:p>
@@ -1031,7 +1031,7 @@
           <a:p>
             <a:fld id="{C75DB29D-57C8-104E-820C-5FC7CEF87FF2}" type="datetimeFigureOut">
               <a:rPr lang="en-US" smtClean="0"/>
-              <a:t>9/1/20</a:t>
+              <a:t>9/13/21</a:t>
             </a:fld>
             <a:endParaRPr lang="en-US"/>
           </a:p>
@@ -1211,7 +1211,7 @@
           <a:p>
             <a:fld id="{C75DB29D-57C8-104E-820C-5FC7CEF87FF2}" type="datetimeFigureOut">
               <a:rPr lang="en-US" smtClean="0"/>
-              <a:t>9/1/20</a:t>
+              <a:t>9/13/21</a:t>
             </a:fld>
             <a:endParaRPr lang="en-US"/>
           </a:p>
@@ -1381,7 +1381,7 @@
           <a:p>
             <a:fld id="{C75DB29D-57C8-104E-820C-5FC7CEF87FF2}" type="datetimeFigureOut">
               <a:rPr lang="en-US" smtClean="0"/>
-              <a:t>9/1/20</a:t>
+              <a:t>9/13/21</a:t>
             </a:fld>
             <a:endParaRPr lang="en-US"/>
           </a:p>
@@ -1625,7 +1625,7 @@
           <a:p>
             <a:fld id="{C75DB29D-57C8-104E-820C-5FC7CEF87FF2}" type="datetimeFigureOut">
               <a:rPr lang="en-US" smtClean="0"/>
-              <a:t>9/1/20</a:t>
+              <a:t>9/13/21</a:t>
             </a:fld>
             <a:endParaRPr lang="en-US"/>
           </a:p>
@@ -1857,7 +1857,7 @@
           <a:p>
             <a:fld id="{C75DB29D-57C8-104E-820C-5FC7CEF87FF2}" type="datetimeFigureOut">
               <a:rPr lang="en-US" smtClean="0"/>
-              <a:t>9/1/20</a:t>
+              <a:t>9/13/21</a:t>
             </a:fld>
             <a:endParaRPr lang="en-US"/>
           </a:p>
@@ -2224,7 +2224,7 @@
           <a:p>
             <a:fld id="{C75DB29D-57C8-104E-820C-5FC7CEF87FF2}" type="datetimeFigureOut">
               <a:rPr lang="en-US" smtClean="0"/>
-              <a:t>9/1/20</a:t>
+              <a:t>9/13/21</a:t>
             </a:fld>
             <a:endParaRPr lang="en-US"/>
           </a:p>
@@ -2342,7 +2342,7 @@
           <a:p>
             <a:fld id="{C75DB29D-57C8-104E-820C-5FC7CEF87FF2}" type="datetimeFigureOut">
               <a:rPr lang="en-US" smtClean="0"/>
-              <a:t>9/1/20</a:t>
+              <a:t>9/13/21</a:t>
             </a:fld>
             <a:endParaRPr lang="en-US"/>
           </a:p>
@@ -2437,7 +2437,7 @@
           <a:p>
             <a:fld id="{C75DB29D-57C8-104E-820C-5FC7CEF87FF2}" type="datetimeFigureOut">
               <a:rPr lang="en-US" smtClean="0"/>
-              <a:t>9/1/20</a:t>
+              <a:t>9/13/21</a:t>
             </a:fld>
             <a:endParaRPr lang="en-US"/>
           </a:p>
@@ -2714,7 +2714,7 @@
           <a:p>
             <a:fld id="{C75DB29D-57C8-104E-820C-5FC7CEF87FF2}" type="datetimeFigureOut">
               <a:rPr lang="en-US" smtClean="0"/>
-              <a:t>9/1/20</a:t>
+              <a:t>9/13/21</a:t>
             </a:fld>
             <a:endParaRPr lang="en-US"/>
           </a:p>
@@ -2971,7 +2971,7 @@
           <a:p>
             <a:fld id="{C75DB29D-57C8-104E-820C-5FC7CEF87FF2}" type="datetimeFigureOut">
               <a:rPr lang="en-US" smtClean="0"/>
-              <a:t>9/1/20</a:t>
+              <a:t>9/13/21</a:t>
             </a:fld>
             <a:endParaRPr lang="en-US"/>
           </a:p>
@@ -3184,7 +3184,7 @@
           <a:p>
             <a:fld id="{C75DB29D-57C8-104E-820C-5FC7CEF87FF2}" type="datetimeFigureOut">
               <a:rPr lang="en-US" smtClean="0"/>
-              <a:t>9/1/20</a:t>
+              <a:t>9/13/21</a:t>
             </a:fld>
             <a:endParaRPr lang="en-US"/>
           </a:p>
@@ -3640,7 +3640,7 @@
                 <a:latin typeface="Arial"/>
                 <a:cs typeface="Arial"/>
               </a:rPr>
-              <a:t>ENS 610 / EP 603!</a:t>
+              <a:t>ESP 610 / EP 603!</a:t>
             </a:r>
             <a:br>
               <a:rPr lang="en-US" b="1" dirty="0">
@@ -4252,7 +4252,7 @@
                 <a:latin typeface="Arial"/>
                 <a:cs typeface="Arial"/>
               </a:rPr>
-              <a:t>ENS 610 / EP 603!</a:t>
+              <a:t>ESP 610 / EP 603!</a:t>
             </a:r>
             <a:br>
               <a:rPr lang="en-US" b="1" dirty="0">

</xml_diff>